<commit_message>
script indexes bug fix
</commit_message>
<xml_diff>
--- a/slides/Lecture 01.pptx
+++ b/slides/Lecture 01.pptx
@@ -447,7 +447,7 @@
                 <a:tab algn="l" pos="10058400"/>
               </a:tabLst>
             </a:pPr>
-            <a:fld id="{40DAA546-457C-4F9A-B1CE-F1020BBA8820}" type="slidenum">
+            <a:fld id="{D927198D-7857-4638-B431-A9FC6D23CC1F}" type="slidenum">
               <a:rPr b="0" lang="en-US" sz="1200" strike="noStrike" u="none">
                 <a:solidFill>
                   <a:srgbClr val="000000"/>
@@ -538,7 +538,7 @@
                 <a:tab algn="l" pos="10058400"/>
               </a:tabLst>
             </a:pPr>
-            <a:fld id="{FB9C8A09-2EB2-440F-9E31-77708B125545}" type="slidenum">
+            <a:fld id="{A78D0019-801B-4AEE-9B86-A929714D3C3A}" type="slidenum">
               <a:rPr b="0" lang="en-US" sz="1200" strike="noStrike" u="none">
                 <a:solidFill>
                   <a:srgbClr val="000000"/>
@@ -710,7 +710,7 @@
                 <a:tab algn="l" pos="10058400"/>
               </a:tabLst>
             </a:pPr>
-            <a:fld id="{C11B7EB3-7B38-4900-BC09-25F30B0CFA42}" type="slidenum">
+            <a:fld id="{45C54B6E-DC84-459B-A816-8F6FFDD9CDB0}" type="slidenum">
               <a:rPr b="0" lang="en-US" sz="1200" strike="noStrike" u="none">
                 <a:solidFill>
                   <a:srgbClr val="000000"/>
@@ -882,7 +882,7 @@
                 <a:tab algn="l" pos="10058400"/>
               </a:tabLst>
             </a:pPr>
-            <a:fld id="{ABC05404-83B0-4177-BEB8-7658B8331835}" type="slidenum">
+            <a:fld id="{97C38C0A-B7C0-4DF5-A8ED-6DFA27132EF6}" type="slidenum">
               <a:rPr b="0" lang="en-US" sz="1200" strike="noStrike" u="none">
                 <a:solidFill>
                   <a:srgbClr val="000000"/>
@@ -1054,7 +1054,7 @@
                 <a:tab algn="l" pos="10058400"/>
               </a:tabLst>
             </a:pPr>
-            <a:fld id="{DA889368-2502-46A1-8DD5-61678CF347F0}" type="slidenum">
+            <a:fld id="{1D2BCB3E-5247-489B-83A7-CD6DF932F9E9}" type="slidenum">
               <a:rPr b="0" lang="en-US" sz="1200" strike="noStrike" u="none">
                 <a:solidFill>
                   <a:srgbClr val="000000"/>
@@ -1226,7 +1226,7 @@
                 <a:tab algn="l" pos="10058400"/>
               </a:tabLst>
             </a:pPr>
-            <a:fld id="{87739DB3-B69F-4608-B4AD-2C28F7F61D76}" type="slidenum">
+            <a:fld id="{D74F9283-91EC-4101-88E4-6F9E0D41F3F5}" type="slidenum">
               <a:rPr b="0" lang="en-US" sz="1200" strike="noStrike" u="none">
                 <a:solidFill>
                   <a:srgbClr val="000000"/>
@@ -1398,7 +1398,7 @@
                 <a:tab algn="l" pos="10058400"/>
               </a:tabLst>
             </a:pPr>
-            <a:fld id="{F883D89D-EE9E-4449-9FC2-0B8883C6FB94}" type="slidenum">
+            <a:fld id="{4823E71E-2DB3-4561-8727-3FF7E6D20D44}" type="slidenum">
               <a:rPr b="0" lang="en-US" sz="1200" strike="noStrike" u="none">
                 <a:solidFill>
                   <a:srgbClr val="000000"/>
@@ -1570,7 +1570,7 @@
                 <a:tab algn="l" pos="10058400"/>
               </a:tabLst>
             </a:pPr>
-            <a:fld id="{595FC8A6-C7F8-44BD-A942-9AA26680D283}" type="slidenum">
+            <a:fld id="{24062D44-F60C-4F12-A31C-8E6CC6C67FF8}" type="slidenum">
               <a:rPr b="0" lang="en-US" sz="1200" strike="noStrike" u="none">
                 <a:solidFill>
                   <a:srgbClr val="000000"/>
@@ -1742,7 +1742,7 @@
                 <a:tab algn="l" pos="10058400"/>
               </a:tabLst>
             </a:pPr>
-            <a:fld id="{71EF40B1-8986-4B5D-B58F-95853E1F9759}" type="slidenum">
+            <a:fld id="{9157B2A2-55D6-40FA-85BB-E14818432DF0}" type="slidenum">
               <a:rPr b="0" lang="en-US" sz="1200" strike="noStrike" u="none">
                 <a:solidFill>
                   <a:srgbClr val="000000"/>
@@ -1914,7 +1914,7 @@
                 <a:tab algn="l" pos="10058400"/>
               </a:tabLst>
             </a:pPr>
-            <a:fld id="{2C32FAB4-18DC-4619-994C-88D31D61DDEC}" type="slidenum">
+            <a:fld id="{417FF553-16C9-4521-B0E6-15AB0DCB2773}" type="slidenum">
               <a:rPr b="0" lang="en-US" sz="1200" strike="noStrike" u="none">
                 <a:solidFill>
                   <a:srgbClr val="000000"/>
@@ -2086,7 +2086,7 @@
                 <a:tab algn="l" pos="10058400"/>
               </a:tabLst>
             </a:pPr>
-            <a:fld id="{E3A7E5DA-C0EF-417E-B841-9E8B3D345694}" type="slidenum">
+            <a:fld id="{86AB054A-36A0-4EDC-8CD9-C4709B0A1AD4}" type="slidenum">
               <a:rPr b="0" lang="en-US" sz="1200" strike="noStrike" u="none">
                 <a:solidFill>
                   <a:srgbClr val="000000"/>
@@ -2258,7 +2258,7 @@
                 <a:tab algn="l" pos="10058400"/>
               </a:tabLst>
             </a:pPr>
-            <a:fld id="{DDBEC9C2-0950-4EDF-9048-28E2132E23A8}" type="slidenum">
+            <a:fld id="{87199DDB-7EDD-42C8-A495-2B230BAA68EE}" type="slidenum">
               <a:rPr b="0" lang="en-US" sz="1200" strike="noStrike" u="none">
                 <a:solidFill>
                   <a:srgbClr val="000000"/>
@@ -2430,7 +2430,7 @@
                 <a:tab algn="l" pos="10058400"/>
               </a:tabLst>
             </a:pPr>
-            <a:fld id="{7451F1EB-0967-4892-9B6A-B004DA57F399}" type="slidenum">
+            <a:fld id="{8A06C3A5-1202-4670-AF3A-075D4A11EB4A}" type="slidenum">
               <a:rPr b="0" lang="en-US" sz="1200" strike="noStrike" u="none">
                 <a:solidFill>
                   <a:srgbClr val="000000"/>
@@ -2602,7 +2602,7 @@
                 <a:tab algn="l" pos="10058400"/>
               </a:tabLst>
             </a:pPr>
-            <a:fld id="{40E39AB4-14C1-4282-8D56-67D379A8DA54}" type="slidenum">
+            <a:fld id="{2B7D3768-1113-46BE-B351-6D204C8AFDD7}" type="slidenum">
               <a:rPr b="0" lang="en-US" sz="1200" strike="noStrike" u="none">
                 <a:solidFill>
                   <a:srgbClr val="000000"/>
@@ -2774,7 +2774,7 @@
                 <a:tab algn="l" pos="10058400"/>
               </a:tabLst>
             </a:pPr>
-            <a:fld id="{045F0B38-1E86-4126-8CCE-7764058B388E}" type="slidenum">
+            <a:fld id="{1708CBF4-DBF4-4CF0-9CE7-646B87CEAE70}" type="slidenum">
               <a:rPr b="0" lang="en-US" sz="1200" strike="noStrike" u="none">
                 <a:solidFill>
                   <a:srgbClr val="000000"/>
@@ -2946,7 +2946,7 @@
                 <a:tab algn="l" pos="10058400"/>
               </a:tabLst>
             </a:pPr>
-            <a:fld id="{0843574F-3112-4801-916A-6FE13C443AC9}" type="slidenum">
+            <a:fld id="{3FDACEBE-BFD8-4498-9479-2806C3E8A4E6}" type="slidenum">
               <a:rPr b="0" lang="en-US" sz="1200" strike="noStrike" u="none">
                 <a:solidFill>
                   <a:srgbClr val="000000"/>
@@ -3118,7 +3118,7 @@
                 <a:tab algn="l" pos="10058400"/>
               </a:tabLst>
             </a:pPr>
-            <a:fld id="{4B14FC48-CBB5-464A-9229-DD62867430FB}" type="slidenum">
+            <a:fld id="{4F1C40BB-9CF4-49C8-B59B-9FE149D924BA}" type="slidenum">
               <a:rPr b="0" lang="en-US" sz="1200" strike="noStrike" u="none">
                 <a:solidFill>
                   <a:srgbClr val="000000"/>
@@ -3290,7 +3290,7 @@
                 <a:tab algn="l" pos="10058400"/>
               </a:tabLst>
             </a:pPr>
-            <a:fld id="{78F04B71-6E49-440C-8C7C-9C246E55C0D2}" type="slidenum">
+            <a:fld id="{9B9C571F-F2A7-47DC-9C2E-B7D05506F500}" type="slidenum">
               <a:rPr b="0" lang="en-US" sz="1200" strike="noStrike" u="none">
                 <a:solidFill>
                   <a:srgbClr val="000000"/>
@@ -3462,7 +3462,7 @@
                 <a:tab algn="l" pos="10058400"/>
               </a:tabLst>
             </a:pPr>
-            <a:fld id="{630AABEF-93B1-474E-8707-403C0B39E93E}" type="slidenum">
+            <a:fld id="{A5C3C039-1859-4D68-96C1-C0DC2802D370}" type="slidenum">
               <a:rPr b="0" lang="en-US" sz="1200" strike="noStrike" u="none">
                 <a:solidFill>
                   <a:srgbClr val="000000"/>
@@ -3634,7 +3634,7 @@
                 <a:tab algn="l" pos="10058400"/>
               </a:tabLst>
             </a:pPr>
-            <a:fld id="{33FEC69D-52DA-4A20-B49A-67D6951E70BC}" type="slidenum">
+            <a:fld id="{9750DE6E-6D98-49A2-8BDD-F44414FA7C67}" type="slidenum">
               <a:rPr b="0" lang="en-US" sz="1200" strike="noStrike" u="none">
                 <a:solidFill>
                   <a:srgbClr val="000000"/>
@@ -3806,7 +3806,7 @@
                 <a:tab algn="l" pos="10058400"/>
               </a:tabLst>
             </a:pPr>
-            <a:fld id="{89495B73-CD1F-472C-BD6C-E8A95CE479DA}" type="slidenum">
+            <a:fld id="{7C67E5AB-D10C-41AD-97CB-A6A9FF2E3E60}" type="slidenum">
               <a:rPr b="0" lang="en-US" sz="1200" strike="noStrike" u="none">
                 <a:solidFill>
                   <a:srgbClr val="000000"/>
@@ -3978,7 +3978,7 @@
                 <a:tab algn="l" pos="10058400"/>
               </a:tabLst>
             </a:pPr>
-            <a:fld id="{7E03834A-644A-4D38-8525-ED634B4D604A}" type="slidenum">
+            <a:fld id="{18C2D06F-A1E5-4AB8-A78F-B819E708E718}" type="slidenum">
               <a:rPr b="0" lang="en-US" sz="1200" strike="noStrike" u="none">
                 <a:solidFill>
                   <a:srgbClr val="000000"/>
@@ -4150,7 +4150,7 @@
                 <a:tab algn="l" pos="10058400"/>
               </a:tabLst>
             </a:pPr>
-            <a:fld id="{0E476D10-62B1-4E65-9112-55BA5499CB10}" type="slidenum">
+            <a:fld id="{8CA69CE9-4623-42D1-A596-674ECAE69BA0}" type="slidenum">
               <a:rPr b="0" lang="en-US" sz="1200" strike="noStrike" u="none">
                 <a:solidFill>
                   <a:srgbClr val="000000"/>
@@ -4322,7 +4322,7 @@
                 <a:tab algn="l" pos="10058400"/>
               </a:tabLst>
             </a:pPr>
-            <a:fld id="{96194D62-1CCC-4237-AD99-5BB56F2D5302}" type="slidenum">
+            <a:fld id="{3A157702-738E-45F3-9F4B-C890BD3C04B7}" type="slidenum">
               <a:rPr b="0" lang="en-US" sz="1200" strike="noStrike" u="none">
                 <a:solidFill>
                   <a:srgbClr val="000000"/>
@@ -4494,7 +4494,7 @@
                 <a:tab algn="l" pos="10058400"/>
               </a:tabLst>
             </a:pPr>
-            <a:fld id="{5CF799C0-6675-4D91-9D45-4BC65C5CC909}" type="slidenum">
+            <a:fld id="{61E5C964-157F-4CC3-9975-4A4A14EB48C6}" type="slidenum">
               <a:rPr b="0" lang="en-US" sz="1200" strike="noStrike" u="none">
                 <a:solidFill>
                   <a:srgbClr val="000000"/>
@@ -4666,7 +4666,7 @@
                 <a:tab algn="l" pos="10058400"/>
               </a:tabLst>
             </a:pPr>
-            <a:fld id="{A7917FFA-8638-44AB-A3A8-F274991242D3}" type="slidenum">
+            <a:fld id="{0E0FBDEA-3931-485C-AE6D-22D7EC683DFF}" type="slidenum">
               <a:rPr b="0" lang="en-US" sz="1200" strike="noStrike" u="none">
                 <a:solidFill>
                   <a:srgbClr val="000000"/>
@@ -4838,7 +4838,7 @@
                 <a:tab algn="l" pos="10058400"/>
               </a:tabLst>
             </a:pPr>
-            <a:fld id="{A2A8E5F8-63F1-4C05-A31B-7E14ED5418A3}" type="slidenum">
+            <a:fld id="{4C4DF234-4B2E-49AE-84A5-DB5F993ED62A}" type="slidenum">
               <a:rPr b="0" lang="en-US" sz="1200" strike="noStrike" u="none">
                 <a:solidFill>
                   <a:srgbClr val="000000"/>
@@ -5010,7 +5010,7 @@
                 <a:tab algn="l" pos="10058400"/>
               </a:tabLst>
             </a:pPr>
-            <a:fld id="{ADF3F831-C3A9-492B-A4BA-6D9382CEC464}" type="slidenum">
+            <a:fld id="{F9A4F561-4B1C-4DA6-AD03-41918A034084}" type="slidenum">
               <a:rPr b="0" lang="en-US" sz="1200" strike="noStrike" u="none">
                 <a:solidFill>
                   <a:srgbClr val="000000"/>
@@ -5182,7 +5182,7 @@
                 <a:tab algn="l" pos="10058400"/>
               </a:tabLst>
             </a:pPr>
-            <a:fld id="{3F70F193-7B5A-45F8-890C-896FA2F3FE42}" type="slidenum">
+            <a:fld id="{FA15BFA3-4FBA-4E33-9157-11312D315486}" type="slidenum">
               <a:rPr b="0" lang="en-US" sz="1200" strike="noStrike" u="none">
                 <a:solidFill>
                   <a:srgbClr val="000000"/>
@@ -5354,7 +5354,7 @@
                 <a:tab algn="l" pos="10058400"/>
               </a:tabLst>
             </a:pPr>
-            <a:fld id="{3BCB7EA9-4726-40E7-802C-C252712660C3}" type="slidenum">
+            <a:fld id="{B674D8BF-C09F-48FD-9A7C-DDD174043DB7}" type="slidenum">
               <a:rPr b="0" lang="en-US" sz="1200" strike="noStrike" u="none">
                 <a:solidFill>
                   <a:srgbClr val="000000"/>
@@ -5526,7 +5526,7 @@
                 <a:tab algn="l" pos="10058400"/>
               </a:tabLst>
             </a:pPr>
-            <a:fld id="{487EB382-1FE0-4E3A-A960-6C3078EDBDB7}" type="slidenum">
+            <a:fld id="{F868D5A7-A9DE-4318-94B4-19472D84845D}" type="slidenum">
               <a:rPr b="0" lang="en-US" sz="1200" strike="noStrike" u="none">
                 <a:solidFill>
                   <a:srgbClr val="000000"/>
@@ -5698,7 +5698,7 @@
                 <a:tab algn="l" pos="10058400"/>
               </a:tabLst>
             </a:pPr>
-            <a:fld id="{4A5F283B-D987-4BA5-A6F3-1571CD19B8AD}" type="slidenum">
+            <a:fld id="{9D144B00-DAAE-4734-90DC-BAB23462AB87}" type="slidenum">
               <a:rPr b="0" lang="en-US" sz="1200" strike="noStrike" u="none">
                 <a:solidFill>
                   <a:srgbClr val="000000"/>
@@ -5870,7 +5870,7 @@
                 <a:tab algn="l" pos="10058400"/>
               </a:tabLst>
             </a:pPr>
-            <a:fld id="{23A98EA5-4B5A-4F2D-A586-88EAC79C3091}" type="slidenum">
+            <a:fld id="{A50286B1-0137-4108-B9B7-597B62929E05}" type="slidenum">
               <a:rPr b="0" lang="en-US" sz="1200" strike="noStrike" u="none">
                 <a:solidFill>
                   <a:srgbClr val="000000"/>
@@ -6042,7 +6042,7 @@
                 <a:tab algn="l" pos="10058400"/>
               </a:tabLst>
             </a:pPr>
-            <a:fld id="{3A4A833B-3DF2-4649-BADA-04356946EDEE}" type="slidenum">
+            <a:fld id="{F309B5FD-A0D1-4F43-95AF-3EA1C47AE2DB}" type="slidenum">
               <a:rPr b="0" lang="en-US" sz="1200" strike="noStrike" u="none">
                 <a:solidFill>
                   <a:srgbClr val="000000"/>
@@ -6214,7 +6214,7 @@
                 <a:tab algn="l" pos="10058400"/>
               </a:tabLst>
             </a:pPr>
-            <a:fld id="{7ED14F9B-2F03-4809-A7A2-8117CD0A2260}" type="slidenum">
+            <a:fld id="{0F47A23D-9D3C-4D8B-AF65-EE21BAFD075A}" type="slidenum">
               <a:rPr b="0" lang="en-US" sz="1200" strike="noStrike" u="none">
                 <a:solidFill>
                   <a:srgbClr val="000000"/>
@@ -6386,7 +6386,7 @@
                 <a:tab algn="l" pos="10058400"/>
               </a:tabLst>
             </a:pPr>
-            <a:fld id="{2168B832-6288-4D45-A4B3-AB01916257C7}" type="slidenum">
+            <a:fld id="{C353BD66-1106-48A6-BC54-25E586B1B3AE}" type="slidenum">
               <a:rPr b="0" lang="en-US" sz="1200" strike="noStrike" u="none">
                 <a:solidFill>
                   <a:srgbClr val="000000"/>
@@ -6558,7 +6558,7 @@
                 <a:tab algn="l" pos="10058400"/>
               </a:tabLst>
             </a:pPr>
-            <a:fld id="{25291C13-1F49-43EC-AC62-EF258F4186F4}" type="slidenum">
+            <a:fld id="{BE2B427F-078C-4786-8EB0-87A244E54E28}" type="slidenum">
               <a:rPr b="0" lang="en-US" sz="1200" strike="noStrike" u="none">
                 <a:solidFill>
                   <a:srgbClr val="000000"/>
@@ -6730,7 +6730,7 @@
                 <a:tab algn="l" pos="10058400"/>
               </a:tabLst>
             </a:pPr>
-            <a:fld id="{8D00002F-A021-4E8D-8811-ED7D0A48A284}" type="slidenum">
+            <a:fld id="{321B92C0-28A8-4252-826A-F9F86C5F70A0}" type="slidenum">
               <a:rPr b="0" lang="en-US" sz="1200" strike="noStrike" u="none">
                 <a:solidFill>
                   <a:srgbClr val="000000"/>
@@ -6902,7 +6902,7 @@
                 <a:tab algn="l" pos="10058400"/>
               </a:tabLst>
             </a:pPr>
-            <a:fld id="{331EDD4C-BD5C-46CF-BDC9-47BBB5751E4A}" type="slidenum">
+            <a:fld id="{ACA21DE9-B25A-46F1-B6F3-7850A9FD29E5}" type="slidenum">
               <a:rPr b="0" lang="en-US" sz="1200" strike="noStrike" u="none">
                 <a:solidFill>
                   <a:srgbClr val="000000"/>
@@ -7074,7 +7074,7 @@
                 <a:tab algn="l" pos="10058400"/>
               </a:tabLst>
             </a:pPr>
-            <a:fld id="{6FE17BBD-2620-4238-8C28-4EADF13E6E8D}" type="slidenum">
+            <a:fld id="{D6B3086A-C291-49EC-BA83-508E227C49EB}" type="slidenum">
               <a:rPr b="0" lang="en-US" sz="1200" strike="noStrike" u="none">
                 <a:solidFill>
                   <a:srgbClr val="000000"/>
@@ -7821,7 +7821,7 @@
               </a:rPr>
               <a:t>Slide </a:t>
             </a:r>
-            <a:fld id="{1ABE8D19-4F2B-4A3E-BB4D-879B7CBA3434}" type="slidenum">
+            <a:fld id="{3DF889B0-63F3-4EDF-AC72-FF2A5606B993}" type="slidenum">
               <a:rPr b="1" lang="en-US" sz="800" strike="noStrike" u="none">
                 <a:solidFill>
                   <a:srgbClr val="ffffff"/>

</xml_diff>

<commit_message>
massive update (respond look more professional, link navigation and range link navigation features release)
</commit_message>
<xml_diff>
--- a/slides/Lecture 01.pptx
+++ b/slides/Lecture 01.pptx
@@ -447,7 +447,7 @@
                 <a:tab algn="l" pos="10058400"/>
               </a:tabLst>
             </a:pPr>
-            <a:fld id="{44B5543B-D54B-48F0-A758-9EC5CC080F8B}" type="slidenum">
+            <a:fld id="{75BC53E8-BDAD-4A5E-BFD5-7DE2CE0EBA72}" type="slidenum">
               <a:rPr b="0" lang="en-US" sz="1200" strike="noStrike" u="none">
                 <a:solidFill>
                   <a:srgbClr val="000000"/>
@@ -538,7 +538,7 @@
                 <a:tab algn="l" pos="10058400"/>
               </a:tabLst>
             </a:pPr>
-            <a:fld id="{DAEE89F2-361F-4E0A-B0A6-F4048F5BD435}" type="slidenum">
+            <a:fld id="{E792D2DC-A406-4599-815B-486070C3CD59}" type="slidenum">
               <a:rPr b="0" lang="en-US" sz="1200" strike="noStrike" u="none">
                 <a:solidFill>
                   <a:srgbClr val="000000"/>
@@ -710,7 +710,7 @@
                 <a:tab algn="l" pos="10058400"/>
               </a:tabLst>
             </a:pPr>
-            <a:fld id="{BF2FA134-7CAC-4CF1-A770-861990E3E4FB}" type="slidenum">
+            <a:fld id="{1CB67576-8D12-4D67-A5A4-66D4798A8573}" type="slidenum">
               <a:rPr b="0" lang="en-US" sz="1200" strike="noStrike" u="none">
                 <a:solidFill>
                   <a:srgbClr val="000000"/>
@@ -882,7 +882,7 @@
                 <a:tab algn="l" pos="10058400"/>
               </a:tabLst>
             </a:pPr>
-            <a:fld id="{2AFC3501-EB09-4D50-804D-224ECCD06CEE}" type="slidenum">
+            <a:fld id="{754D474D-0500-45DB-B7CE-CCF76A8068BE}" type="slidenum">
               <a:rPr b="0" lang="en-US" sz="1200" strike="noStrike" u="none">
                 <a:solidFill>
                   <a:srgbClr val="000000"/>
@@ -1054,7 +1054,7 @@
                 <a:tab algn="l" pos="10058400"/>
               </a:tabLst>
             </a:pPr>
-            <a:fld id="{233670FB-A1A5-40D2-A79C-9FB48CF33366}" type="slidenum">
+            <a:fld id="{B502451A-7B17-4C16-8337-A00CEB741574}" type="slidenum">
               <a:rPr b="0" lang="en-US" sz="1200" strike="noStrike" u="none">
                 <a:solidFill>
                   <a:srgbClr val="000000"/>
@@ -1226,7 +1226,7 @@
                 <a:tab algn="l" pos="10058400"/>
               </a:tabLst>
             </a:pPr>
-            <a:fld id="{D8A0B5F1-9AEE-4B20-B284-9A59160350D1}" type="slidenum">
+            <a:fld id="{296F9FE6-7333-4BB9-9569-E1FDD092AC93}" type="slidenum">
               <a:rPr b="0" lang="en-US" sz="1200" strike="noStrike" u="none">
                 <a:solidFill>
                   <a:srgbClr val="000000"/>
@@ -1398,7 +1398,7 @@
                 <a:tab algn="l" pos="10058400"/>
               </a:tabLst>
             </a:pPr>
-            <a:fld id="{40EC33C7-14F4-493D-93FE-1B8A0E07FF2B}" type="slidenum">
+            <a:fld id="{60AF6DA7-45D1-4237-B043-8FA75A6F8EFE}" type="slidenum">
               <a:rPr b="0" lang="en-US" sz="1200" strike="noStrike" u="none">
                 <a:solidFill>
                   <a:srgbClr val="000000"/>
@@ -1570,7 +1570,7 @@
                 <a:tab algn="l" pos="10058400"/>
               </a:tabLst>
             </a:pPr>
-            <a:fld id="{8C6FA963-86EF-4DA4-BD1F-74D83D490C36}" type="slidenum">
+            <a:fld id="{5765A356-BDCC-4218-A072-12D498EE3A01}" type="slidenum">
               <a:rPr b="0" lang="en-US" sz="1200" strike="noStrike" u="none">
                 <a:solidFill>
                   <a:srgbClr val="000000"/>
@@ -1742,7 +1742,7 @@
                 <a:tab algn="l" pos="10058400"/>
               </a:tabLst>
             </a:pPr>
-            <a:fld id="{3033B958-31F6-4155-8376-E91B193E3093}" type="slidenum">
+            <a:fld id="{E35FC914-04F8-4662-9620-1ACFEE269F50}" type="slidenum">
               <a:rPr b="0" lang="en-US" sz="1200" strike="noStrike" u="none">
                 <a:solidFill>
                   <a:srgbClr val="000000"/>
@@ -1914,7 +1914,7 @@
                 <a:tab algn="l" pos="10058400"/>
               </a:tabLst>
             </a:pPr>
-            <a:fld id="{B9AAF1C3-C842-4C5B-994D-407299C5D292}" type="slidenum">
+            <a:fld id="{0B586BE2-229E-4E6F-9135-C868F7D17860}" type="slidenum">
               <a:rPr b="0" lang="en-US" sz="1200" strike="noStrike" u="none">
                 <a:solidFill>
                   <a:srgbClr val="000000"/>
@@ -2086,7 +2086,7 @@
                 <a:tab algn="l" pos="10058400"/>
               </a:tabLst>
             </a:pPr>
-            <a:fld id="{B014EF9D-0E1A-43F4-AD91-9ACD8FB360B2}" type="slidenum">
+            <a:fld id="{11885619-4427-4267-9EA5-199F78CF8B2F}" type="slidenum">
               <a:rPr b="0" lang="en-US" sz="1200" strike="noStrike" u="none">
                 <a:solidFill>
                   <a:srgbClr val="000000"/>
@@ -2258,7 +2258,7 @@
                 <a:tab algn="l" pos="10058400"/>
               </a:tabLst>
             </a:pPr>
-            <a:fld id="{585445A0-39CA-45A2-A41F-D8B6A1D8A1B0}" type="slidenum">
+            <a:fld id="{012F5AC7-A1BF-4ED9-8E99-A5827749D95A}" type="slidenum">
               <a:rPr b="0" lang="en-US" sz="1200" strike="noStrike" u="none">
                 <a:solidFill>
                   <a:srgbClr val="000000"/>
@@ -2430,7 +2430,7 @@
                 <a:tab algn="l" pos="10058400"/>
               </a:tabLst>
             </a:pPr>
-            <a:fld id="{E951A801-95B8-43FB-8471-7A56F938C866}" type="slidenum">
+            <a:fld id="{65280550-34AD-40FC-BDFE-D83E47F6AD15}" type="slidenum">
               <a:rPr b="0" lang="en-US" sz="1200" strike="noStrike" u="none">
                 <a:solidFill>
                   <a:srgbClr val="000000"/>
@@ -2602,7 +2602,7 @@
                 <a:tab algn="l" pos="10058400"/>
               </a:tabLst>
             </a:pPr>
-            <a:fld id="{AB1CF15A-8B92-4B05-A117-4FB7E834DBBE}" type="slidenum">
+            <a:fld id="{C6544DA4-C05B-420E-9AE6-CE21DC81D71D}" type="slidenum">
               <a:rPr b="0" lang="en-US" sz="1200" strike="noStrike" u="none">
                 <a:solidFill>
                   <a:srgbClr val="000000"/>
@@ -2774,7 +2774,7 @@
                 <a:tab algn="l" pos="10058400"/>
               </a:tabLst>
             </a:pPr>
-            <a:fld id="{3EF57311-FAFE-48DB-AF4B-8DD5F69D38BC}" type="slidenum">
+            <a:fld id="{54724CAD-7A0A-47B2-B7AE-98053C44FF90}" type="slidenum">
               <a:rPr b="0" lang="en-US" sz="1200" strike="noStrike" u="none">
                 <a:solidFill>
                   <a:srgbClr val="000000"/>
@@ -2946,7 +2946,7 @@
                 <a:tab algn="l" pos="10058400"/>
               </a:tabLst>
             </a:pPr>
-            <a:fld id="{85006ADE-E1AB-4F82-94A2-0CFC06B521CC}" type="slidenum">
+            <a:fld id="{B3F8F789-F341-4626-A99D-0B6439C88C3B}" type="slidenum">
               <a:rPr b="0" lang="en-US" sz="1200" strike="noStrike" u="none">
                 <a:solidFill>
                   <a:srgbClr val="000000"/>
@@ -3118,7 +3118,7 @@
                 <a:tab algn="l" pos="10058400"/>
               </a:tabLst>
             </a:pPr>
-            <a:fld id="{EF3F3A22-C77E-4AC8-A41B-15E5F926D8C1}" type="slidenum">
+            <a:fld id="{6B93630B-DFD3-4B2E-87AF-9857A0CE56C4}" type="slidenum">
               <a:rPr b="0" lang="en-US" sz="1200" strike="noStrike" u="none">
                 <a:solidFill>
                   <a:srgbClr val="000000"/>
@@ -3290,7 +3290,7 @@
                 <a:tab algn="l" pos="10058400"/>
               </a:tabLst>
             </a:pPr>
-            <a:fld id="{D4B26426-B0AF-4AE4-8C07-CD22B74E3DBD}" type="slidenum">
+            <a:fld id="{6A8C1915-40A0-41D2-B2E6-227792819732}" type="slidenum">
               <a:rPr b="0" lang="en-US" sz="1200" strike="noStrike" u="none">
                 <a:solidFill>
                   <a:srgbClr val="000000"/>
@@ -3462,7 +3462,7 @@
                 <a:tab algn="l" pos="10058400"/>
               </a:tabLst>
             </a:pPr>
-            <a:fld id="{FCBBB873-A8D1-4755-A891-A36B9C7A9507}" type="slidenum">
+            <a:fld id="{F295D978-F106-49EB-BB0D-824D37169E1D}" type="slidenum">
               <a:rPr b="0" lang="en-US" sz="1200" strike="noStrike" u="none">
                 <a:solidFill>
                   <a:srgbClr val="000000"/>
@@ -3634,7 +3634,7 @@
                 <a:tab algn="l" pos="10058400"/>
               </a:tabLst>
             </a:pPr>
-            <a:fld id="{68F3131D-505C-444D-945B-3C97EE17DC60}" type="slidenum">
+            <a:fld id="{CCA98960-8AB7-41E5-A27B-FBC672493D73}" type="slidenum">
               <a:rPr b="0" lang="en-US" sz="1200" strike="noStrike" u="none">
                 <a:solidFill>
                   <a:srgbClr val="000000"/>
@@ -3806,7 +3806,7 @@
                 <a:tab algn="l" pos="10058400"/>
               </a:tabLst>
             </a:pPr>
-            <a:fld id="{CA5433DC-B167-4907-A6BC-188E175FD540}" type="slidenum">
+            <a:fld id="{C286E097-4487-4FEC-AC64-C161C5A07CC7}" type="slidenum">
               <a:rPr b="0" lang="en-US" sz="1200" strike="noStrike" u="none">
                 <a:solidFill>
                   <a:srgbClr val="000000"/>
@@ -3978,7 +3978,7 @@
                 <a:tab algn="l" pos="10058400"/>
               </a:tabLst>
             </a:pPr>
-            <a:fld id="{EE607BB8-C2C1-4651-8612-08E5B2A41DB0}" type="slidenum">
+            <a:fld id="{4CE8A140-6EDE-4F16-8429-204C23F16523}" type="slidenum">
               <a:rPr b="0" lang="en-US" sz="1200" strike="noStrike" u="none">
                 <a:solidFill>
                   <a:srgbClr val="000000"/>
@@ -4150,7 +4150,7 @@
                 <a:tab algn="l" pos="10058400"/>
               </a:tabLst>
             </a:pPr>
-            <a:fld id="{C4D76B6A-116B-4B61-AF45-FE0102F94765}" type="slidenum">
+            <a:fld id="{F581A94C-F2AF-4FC7-AE19-F345AA2F057A}" type="slidenum">
               <a:rPr b="0" lang="en-US" sz="1200" strike="noStrike" u="none">
                 <a:solidFill>
                   <a:srgbClr val="000000"/>
@@ -4322,7 +4322,7 @@
                 <a:tab algn="l" pos="10058400"/>
               </a:tabLst>
             </a:pPr>
-            <a:fld id="{8B32740B-A4E0-49F4-95D4-73DCF88810BA}" type="slidenum">
+            <a:fld id="{32E996DB-E450-4AAE-8A4D-A20FEAE7FCD3}" type="slidenum">
               <a:rPr b="0" lang="en-US" sz="1200" strike="noStrike" u="none">
                 <a:solidFill>
                   <a:srgbClr val="000000"/>
@@ -4494,7 +4494,7 @@
                 <a:tab algn="l" pos="10058400"/>
               </a:tabLst>
             </a:pPr>
-            <a:fld id="{5995FEC6-7FE1-45AE-98C1-EE988A5B2B03}" type="slidenum">
+            <a:fld id="{0484E0A5-3B84-4854-829F-8CE33EE2DB62}" type="slidenum">
               <a:rPr b="0" lang="en-US" sz="1200" strike="noStrike" u="none">
                 <a:solidFill>
                   <a:srgbClr val="000000"/>
@@ -4666,7 +4666,7 @@
                 <a:tab algn="l" pos="10058400"/>
               </a:tabLst>
             </a:pPr>
-            <a:fld id="{E08E2759-4BA8-4759-BB7C-B2EB2210E5CC}" type="slidenum">
+            <a:fld id="{C85728A3-7849-4888-8B1F-5C2491A8937F}" type="slidenum">
               <a:rPr b="0" lang="en-US" sz="1200" strike="noStrike" u="none">
                 <a:solidFill>
                   <a:srgbClr val="000000"/>
@@ -4838,7 +4838,7 @@
                 <a:tab algn="l" pos="10058400"/>
               </a:tabLst>
             </a:pPr>
-            <a:fld id="{F526465F-7773-4D17-ADB5-BFBC91D07421}" type="slidenum">
+            <a:fld id="{94C82FCA-A377-4510-9C66-193C012C6D95}" type="slidenum">
               <a:rPr b="0" lang="en-US" sz="1200" strike="noStrike" u="none">
                 <a:solidFill>
                   <a:srgbClr val="000000"/>
@@ -5010,7 +5010,7 @@
                 <a:tab algn="l" pos="10058400"/>
               </a:tabLst>
             </a:pPr>
-            <a:fld id="{16E59CED-3E0E-41C1-8BAD-0A69FB4E9F3D}" type="slidenum">
+            <a:fld id="{A1EDAC8C-E665-470D-A082-6B69DAB05A4E}" type="slidenum">
               <a:rPr b="0" lang="en-US" sz="1200" strike="noStrike" u="none">
                 <a:solidFill>
                   <a:srgbClr val="000000"/>
@@ -5182,7 +5182,7 @@
                 <a:tab algn="l" pos="10058400"/>
               </a:tabLst>
             </a:pPr>
-            <a:fld id="{5097ACDC-4925-408A-BD61-1D08825DAE17}" type="slidenum">
+            <a:fld id="{5981346B-7F10-4BE6-A310-CC7DFD883876}" type="slidenum">
               <a:rPr b="0" lang="en-US" sz="1200" strike="noStrike" u="none">
                 <a:solidFill>
                   <a:srgbClr val="000000"/>
@@ -5354,7 +5354,7 @@
                 <a:tab algn="l" pos="10058400"/>
               </a:tabLst>
             </a:pPr>
-            <a:fld id="{59302E59-DFCE-4A8B-8B13-94433B4EAA22}" type="slidenum">
+            <a:fld id="{8FDF9623-8DEB-48D6-AE88-F207B5CA7256}" type="slidenum">
               <a:rPr b="0" lang="en-US" sz="1200" strike="noStrike" u="none">
                 <a:solidFill>
                   <a:srgbClr val="000000"/>
@@ -5526,7 +5526,7 @@
                 <a:tab algn="l" pos="10058400"/>
               </a:tabLst>
             </a:pPr>
-            <a:fld id="{393E25B4-6DFA-4BF1-99FD-4E52E546B2C6}" type="slidenum">
+            <a:fld id="{48A1B43E-1356-4EFC-A2DE-8D267137723D}" type="slidenum">
               <a:rPr b="0" lang="en-US" sz="1200" strike="noStrike" u="none">
                 <a:solidFill>
                   <a:srgbClr val="000000"/>
@@ -5698,7 +5698,7 @@
                 <a:tab algn="l" pos="10058400"/>
               </a:tabLst>
             </a:pPr>
-            <a:fld id="{D284D969-0863-47A2-82FD-7DB418A306BE}" type="slidenum">
+            <a:fld id="{BE929B17-9A6B-4361-8C92-400C5776931E}" type="slidenum">
               <a:rPr b="0" lang="en-US" sz="1200" strike="noStrike" u="none">
                 <a:solidFill>
                   <a:srgbClr val="000000"/>
@@ -5870,7 +5870,7 @@
                 <a:tab algn="l" pos="10058400"/>
               </a:tabLst>
             </a:pPr>
-            <a:fld id="{695601AA-7534-4648-8AF6-2A9B064561E5}" type="slidenum">
+            <a:fld id="{6CF83146-DA12-4AB8-80D2-140933932C12}" type="slidenum">
               <a:rPr b="0" lang="en-US" sz="1200" strike="noStrike" u="none">
                 <a:solidFill>
                   <a:srgbClr val="000000"/>
@@ -6042,7 +6042,7 @@
                 <a:tab algn="l" pos="10058400"/>
               </a:tabLst>
             </a:pPr>
-            <a:fld id="{79EEAC74-6C28-495A-B58A-0D9D32809440}" type="slidenum">
+            <a:fld id="{77FFC843-CEC0-491E-8AFE-3429B480C446}" type="slidenum">
               <a:rPr b="0" lang="en-US" sz="1200" strike="noStrike" u="none">
                 <a:solidFill>
                   <a:srgbClr val="000000"/>
@@ -6214,7 +6214,7 @@
                 <a:tab algn="l" pos="10058400"/>
               </a:tabLst>
             </a:pPr>
-            <a:fld id="{D97EC15F-72E9-4E60-AE11-EA836803F555}" type="slidenum">
+            <a:fld id="{47D208B1-9104-4B28-9027-F3598EE41735}" type="slidenum">
               <a:rPr b="0" lang="en-US" sz="1200" strike="noStrike" u="none">
                 <a:solidFill>
                   <a:srgbClr val="000000"/>
@@ -6386,7 +6386,7 @@
                 <a:tab algn="l" pos="10058400"/>
               </a:tabLst>
             </a:pPr>
-            <a:fld id="{8FE74707-247E-41B7-BE5D-26889F83B086}" type="slidenum">
+            <a:fld id="{DCC8D5D7-96B7-4CC4-97F1-EE472453EE8A}" type="slidenum">
               <a:rPr b="0" lang="en-US" sz="1200" strike="noStrike" u="none">
                 <a:solidFill>
                   <a:srgbClr val="000000"/>
@@ -6558,7 +6558,7 @@
                 <a:tab algn="l" pos="10058400"/>
               </a:tabLst>
             </a:pPr>
-            <a:fld id="{842AF830-64ED-41EF-9BDA-2C2CEE1E9CCE}" type="slidenum">
+            <a:fld id="{A2C184A1-59E0-47F9-8EC4-B94992C9BE36}" type="slidenum">
               <a:rPr b="0" lang="en-US" sz="1200" strike="noStrike" u="none">
                 <a:solidFill>
                   <a:srgbClr val="000000"/>
@@ -6730,7 +6730,7 @@
                 <a:tab algn="l" pos="10058400"/>
               </a:tabLst>
             </a:pPr>
-            <a:fld id="{3ECDC7AF-0445-4FD8-A420-C2D1EC0404E3}" type="slidenum">
+            <a:fld id="{A91EEBB3-CD40-4D45-82C3-9F1CC0581FDE}" type="slidenum">
               <a:rPr b="0" lang="en-US" sz="1200" strike="noStrike" u="none">
                 <a:solidFill>
                   <a:srgbClr val="000000"/>
@@ -6902,7 +6902,7 @@
                 <a:tab algn="l" pos="10058400"/>
               </a:tabLst>
             </a:pPr>
-            <a:fld id="{E6E842E1-E729-4404-AAD9-4B9DEC633E95}" type="slidenum">
+            <a:fld id="{6B27AF9C-4743-4299-B764-0DC46E36FECA}" type="slidenum">
               <a:rPr b="0" lang="en-US" sz="1200" strike="noStrike" u="none">
                 <a:solidFill>
                   <a:srgbClr val="000000"/>
@@ -7074,7 +7074,7 @@
                 <a:tab algn="l" pos="10058400"/>
               </a:tabLst>
             </a:pPr>
-            <a:fld id="{AAE11667-70D4-4669-A808-643FE988810C}" type="slidenum">
+            <a:fld id="{F03A4F08-6C88-44B5-91FF-69A0550713D6}" type="slidenum">
               <a:rPr b="0" lang="en-US" sz="1200" strike="noStrike" u="none">
                 <a:solidFill>
                   <a:srgbClr val="000000"/>
@@ -7821,7 +7821,7 @@
               </a:rPr>
               <a:t>Slide </a:t>
             </a:r>
-            <a:fld id="{01B9469B-1167-41AD-B03D-0DE10ADDF661}" type="slidenum">
+            <a:fld id="{9822078A-19F1-4A99-9CBF-6A084F2BEBA1}" type="slidenum">
               <a:rPr b="1" lang="en-US" sz="800" strike="noStrike" u="none">
                 <a:solidFill>
                   <a:srgbClr val="ffffff"/>

</xml_diff>

<commit_message>
features update on the functionality of the searching
</commit_message>
<xml_diff>
--- a/slides/Lecture 01.pptx
+++ b/slides/Lecture 01.pptx
@@ -447,7 +447,7 @@
                 <a:tab algn="l" pos="10058400"/>
               </a:tabLst>
             </a:pPr>
-            <a:fld id="{75BC53E8-BDAD-4A5E-BFD5-7DE2CE0EBA72}" type="slidenum">
+            <a:fld id="{4E1DA721-5A8D-464F-A686-9A2189920327}" type="slidenum">
               <a:rPr b="0" lang="en-US" sz="1200" strike="noStrike" u="none">
                 <a:solidFill>
                   <a:srgbClr val="000000"/>
@@ -538,7 +538,7 @@
                 <a:tab algn="l" pos="10058400"/>
               </a:tabLst>
             </a:pPr>
-            <a:fld id="{E792D2DC-A406-4599-815B-486070C3CD59}" type="slidenum">
+            <a:fld id="{904F7181-DBFD-4784-8785-AEC5EEFA5E2D}" type="slidenum">
               <a:rPr b="0" lang="en-US" sz="1200" strike="noStrike" u="none">
                 <a:solidFill>
                   <a:srgbClr val="000000"/>
@@ -710,7 +710,7 @@
                 <a:tab algn="l" pos="10058400"/>
               </a:tabLst>
             </a:pPr>
-            <a:fld id="{1CB67576-8D12-4D67-A5A4-66D4798A8573}" type="slidenum">
+            <a:fld id="{2EB0821B-BA6B-439D-B6EE-7BA338075891}" type="slidenum">
               <a:rPr b="0" lang="en-US" sz="1200" strike="noStrike" u="none">
                 <a:solidFill>
                   <a:srgbClr val="000000"/>
@@ -882,7 +882,7 @@
                 <a:tab algn="l" pos="10058400"/>
               </a:tabLst>
             </a:pPr>
-            <a:fld id="{754D474D-0500-45DB-B7CE-CCF76A8068BE}" type="slidenum">
+            <a:fld id="{E3C8673F-FCF2-4E1C-80DA-F4EA45098599}" type="slidenum">
               <a:rPr b="0" lang="en-US" sz="1200" strike="noStrike" u="none">
                 <a:solidFill>
                   <a:srgbClr val="000000"/>
@@ -1054,7 +1054,7 @@
                 <a:tab algn="l" pos="10058400"/>
               </a:tabLst>
             </a:pPr>
-            <a:fld id="{B502451A-7B17-4C16-8337-A00CEB741574}" type="slidenum">
+            <a:fld id="{2CD5FA62-9C99-4938-B170-BE3577F0D607}" type="slidenum">
               <a:rPr b="0" lang="en-US" sz="1200" strike="noStrike" u="none">
                 <a:solidFill>
                   <a:srgbClr val="000000"/>
@@ -1226,7 +1226,7 @@
                 <a:tab algn="l" pos="10058400"/>
               </a:tabLst>
             </a:pPr>
-            <a:fld id="{296F9FE6-7333-4BB9-9569-E1FDD092AC93}" type="slidenum">
+            <a:fld id="{12462A13-2C57-4DA0-AEAA-1B9A3D6A3D00}" type="slidenum">
               <a:rPr b="0" lang="en-US" sz="1200" strike="noStrike" u="none">
                 <a:solidFill>
                   <a:srgbClr val="000000"/>
@@ -1398,7 +1398,7 @@
                 <a:tab algn="l" pos="10058400"/>
               </a:tabLst>
             </a:pPr>
-            <a:fld id="{60AF6DA7-45D1-4237-B043-8FA75A6F8EFE}" type="slidenum">
+            <a:fld id="{BA1830DE-5F1C-444C-8ECB-2403E7E05585}" type="slidenum">
               <a:rPr b="0" lang="en-US" sz="1200" strike="noStrike" u="none">
                 <a:solidFill>
                   <a:srgbClr val="000000"/>
@@ -1570,7 +1570,7 @@
                 <a:tab algn="l" pos="10058400"/>
               </a:tabLst>
             </a:pPr>
-            <a:fld id="{5765A356-BDCC-4218-A072-12D498EE3A01}" type="slidenum">
+            <a:fld id="{CB290F63-43C8-48E2-A8E1-91EFF6200603}" type="slidenum">
               <a:rPr b="0" lang="en-US" sz="1200" strike="noStrike" u="none">
                 <a:solidFill>
                   <a:srgbClr val="000000"/>
@@ -1742,7 +1742,7 @@
                 <a:tab algn="l" pos="10058400"/>
               </a:tabLst>
             </a:pPr>
-            <a:fld id="{E35FC914-04F8-4662-9620-1ACFEE269F50}" type="slidenum">
+            <a:fld id="{005C615E-D558-4799-BCB0-42D9D034A9AD}" type="slidenum">
               <a:rPr b="0" lang="en-US" sz="1200" strike="noStrike" u="none">
                 <a:solidFill>
                   <a:srgbClr val="000000"/>
@@ -1914,7 +1914,7 @@
                 <a:tab algn="l" pos="10058400"/>
               </a:tabLst>
             </a:pPr>
-            <a:fld id="{0B586BE2-229E-4E6F-9135-C868F7D17860}" type="slidenum">
+            <a:fld id="{BD5147FF-7120-4142-BBE2-CFDCE553F8F6}" type="slidenum">
               <a:rPr b="0" lang="en-US" sz="1200" strike="noStrike" u="none">
                 <a:solidFill>
                   <a:srgbClr val="000000"/>
@@ -2086,7 +2086,7 @@
                 <a:tab algn="l" pos="10058400"/>
               </a:tabLst>
             </a:pPr>
-            <a:fld id="{11885619-4427-4267-9EA5-199F78CF8B2F}" type="slidenum">
+            <a:fld id="{F97BDD8E-B649-46EA-8434-E0293B575EB3}" type="slidenum">
               <a:rPr b="0" lang="en-US" sz="1200" strike="noStrike" u="none">
                 <a:solidFill>
                   <a:srgbClr val="000000"/>
@@ -2258,7 +2258,7 @@
                 <a:tab algn="l" pos="10058400"/>
               </a:tabLst>
             </a:pPr>
-            <a:fld id="{012F5AC7-A1BF-4ED9-8E99-A5827749D95A}" type="slidenum">
+            <a:fld id="{6FA90323-B7E9-4C1C-B1DD-AC7A0ACA5E9E}" type="slidenum">
               <a:rPr b="0" lang="en-US" sz="1200" strike="noStrike" u="none">
                 <a:solidFill>
                   <a:srgbClr val="000000"/>
@@ -2430,7 +2430,7 @@
                 <a:tab algn="l" pos="10058400"/>
               </a:tabLst>
             </a:pPr>
-            <a:fld id="{65280550-34AD-40FC-BDFE-D83E47F6AD15}" type="slidenum">
+            <a:fld id="{0E46E44E-3697-48CE-A1A5-5C4881E0ABEE}" type="slidenum">
               <a:rPr b="0" lang="en-US" sz="1200" strike="noStrike" u="none">
                 <a:solidFill>
                   <a:srgbClr val="000000"/>
@@ -2602,7 +2602,7 @@
                 <a:tab algn="l" pos="10058400"/>
               </a:tabLst>
             </a:pPr>
-            <a:fld id="{C6544DA4-C05B-420E-9AE6-CE21DC81D71D}" type="slidenum">
+            <a:fld id="{FE766E0C-1AC0-4232-A0EB-AB2B5D93337D}" type="slidenum">
               <a:rPr b="0" lang="en-US" sz="1200" strike="noStrike" u="none">
                 <a:solidFill>
                   <a:srgbClr val="000000"/>
@@ -2774,7 +2774,7 @@
                 <a:tab algn="l" pos="10058400"/>
               </a:tabLst>
             </a:pPr>
-            <a:fld id="{54724CAD-7A0A-47B2-B7AE-98053C44FF90}" type="slidenum">
+            <a:fld id="{A32DDDA0-A266-408F-8996-26A7D3C8454B}" type="slidenum">
               <a:rPr b="0" lang="en-US" sz="1200" strike="noStrike" u="none">
                 <a:solidFill>
                   <a:srgbClr val="000000"/>
@@ -2946,7 +2946,7 @@
                 <a:tab algn="l" pos="10058400"/>
               </a:tabLst>
             </a:pPr>
-            <a:fld id="{B3F8F789-F341-4626-A99D-0B6439C88C3B}" type="slidenum">
+            <a:fld id="{13C27BEA-347D-4D59-81EE-92C9FF28A947}" type="slidenum">
               <a:rPr b="0" lang="en-US" sz="1200" strike="noStrike" u="none">
                 <a:solidFill>
                   <a:srgbClr val="000000"/>
@@ -3118,7 +3118,7 @@
                 <a:tab algn="l" pos="10058400"/>
               </a:tabLst>
             </a:pPr>
-            <a:fld id="{6B93630B-DFD3-4B2E-87AF-9857A0CE56C4}" type="slidenum">
+            <a:fld id="{E6EEBAA7-041A-480B-868E-3FF9E633A806}" type="slidenum">
               <a:rPr b="0" lang="en-US" sz="1200" strike="noStrike" u="none">
                 <a:solidFill>
                   <a:srgbClr val="000000"/>
@@ -3290,7 +3290,7 @@
                 <a:tab algn="l" pos="10058400"/>
               </a:tabLst>
             </a:pPr>
-            <a:fld id="{6A8C1915-40A0-41D2-B2E6-227792819732}" type="slidenum">
+            <a:fld id="{CC20D640-B576-4A0B-BFA5-3874C9C6BB2C}" type="slidenum">
               <a:rPr b="0" lang="en-US" sz="1200" strike="noStrike" u="none">
                 <a:solidFill>
                   <a:srgbClr val="000000"/>
@@ -3462,7 +3462,7 @@
                 <a:tab algn="l" pos="10058400"/>
               </a:tabLst>
             </a:pPr>
-            <a:fld id="{F295D978-F106-49EB-BB0D-824D37169E1D}" type="slidenum">
+            <a:fld id="{A5274A64-C905-4752-9EDA-064C9EB8FEDD}" type="slidenum">
               <a:rPr b="0" lang="en-US" sz="1200" strike="noStrike" u="none">
                 <a:solidFill>
                   <a:srgbClr val="000000"/>
@@ -3634,7 +3634,7 @@
                 <a:tab algn="l" pos="10058400"/>
               </a:tabLst>
             </a:pPr>
-            <a:fld id="{CCA98960-8AB7-41E5-A27B-FBC672493D73}" type="slidenum">
+            <a:fld id="{FD4F528C-1C54-4383-AE9C-6EF6AA029A4E}" type="slidenum">
               <a:rPr b="0" lang="en-US" sz="1200" strike="noStrike" u="none">
                 <a:solidFill>
                   <a:srgbClr val="000000"/>
@@ -3806,7 +3806,7 @@
                 <a:tab algn="l" pos="10058400"/>
               </a:tabLst>
             </a:pPr>
-            <a:fld id="{C286E097-4487-4FEC-AC64-C161C5A07CC7}" type="slidenum">
+            <a:fld id="{BA4FF2E6-6EC2-43C1-A8B6-0F6B2C8D189B}" type="slidenum">
               <a:rPr b="0" lang="en-US" sz="1200" strike="noStrike" u="none">
                 <a:solidFill>
                   <a:srgbClr val="000000"/>
@@ -3978,7 +3978,7 @@
                 <a:tab algn="l" pos="10058400"/>
               </a:tabLst>
             </a:pPr>
-            <a:fld id="{4CE8A140-6EDE-4F16-8429-204C23F16523}" type="slidenum">
+            <a:fld id="{ADD94BBC-E9B2-4EDA-B295-29442482BD2E}" type="slidenum">
               <a:rPr b="0" lang="en-US" sz="1200" strike="noStrike" u="none">
                 <a:solidFill>
                   <a:srgbClr val="000000"/>
@@ -4150,7 +4150,7 @@
                 <a:tab algn="l" pos="10058400"/>
               </a:tabLst>
             </a:pPr>
-            <a:fld id="{F581A94C-F2AF-4FC7-AE19-F345AA2F057A}" type="slidenum">
+            <a:fld id="{9CA1FDD6-0378-44D8-A535-5651A015019B}" type="slidenum">
               <a:rPr b="0" lang="en-US" sz="1200" strike="noStrike" u="none">
                 <a:solidFill>
                   <a:srgbClr val="000000"/>
@@ -4322,7 +4322,7 @@
                 <a:tab algn="l" pos="10058400"/>
               </a:tabLst>
             </a:pPr>
-            <a:fld id="{32E996DB-E450-4AAE-8A4D-A20FEAE7FCD3}" type="slidenum">
+            <a:fld id="{D7245793-FAF2-448A-803D-AD5CC2997C3C}" type="slidenum">
               <a:rPr b="0" lang="en-US" sz="1200" strike="noStrike" u="none">
                 <a:solidFill>
                   <a:srgbClr val="000000"/>
@@ -4494,7 +4494,7 @@
                 <a:tab algn="l" pos="10058400"/>
               </a:tabLst>
             </a:pPr>
-            <a:fld id="{0484E0A5-3B84-4854-829F-8CE33EE2DB62}" type="slidenum">
+            <a:fld id="{161C5657-AEA9-4FFE-ACA6-8135CFE0E447}" type="slidenum">
               <a:rPr b="0" lang="en-US" sz="1200" strike="noStrike" u="none">
                 <a:solidFill>
                   <a:srgbClr val="000000"/>
@@ -4666,7 +4666,7 @@
                 <a:tab algn="l" pos="10058400"/>
               </a:tabLst>
             </a:pPr>
-            <a:fld id="{C85728A3-7849-4888-8B1F-5C2491A8937F}" type="slidenum">
+            <a:fld id="{5A0C1FF1-B15D-466D-9EB0-3C9C09773796}" type="slidenum">
               <a:rPr b="0" lang="en-US" sz="1200" strike="noStrike" u="none">
                 <a:solidFill>
                   <a:srgbClr val="000000"/>
@@ -4838,7 +4838,7 @@
                 <a:tab algn="l" pos="10058400"/>
               </a:tabLst>
             </a:pPr>
-            <a:fld id="{94C82FCA-A377-4510-9C66-193C012C6D95}" type="slidenum">
+            <a:fld id="{AAA82E6B-46FE-4ED9-A771-FFCF0EBA2DC1}" type="slidenum">
               <a:rPr b="0" lang="en-US" sz="1200" strike="noStrike" u="none">
                 <a:solidFill>
                   <a:srgbClr val="000000"/>
@@ -5010,7 +5010,7 @@
                 <a:tab algn="l" pos="10058400"/>
               </a:tabLst>
             </a:pPr>
-            <a:fld id="{A1EDAC8C-E665-470D-A082-6B69DAB05A4E}" type="slidenum">
+            <a:fld id="{0AED20DA-B937-49A1-B4FD-7D932D13C2BA}" type="slidenum">
               <a:rPr b="0" lang="en-US" sz="1200" strike="noStrike" u="none">
                 <a:solidFill>
                   <a:srgbClr val="000000"/>
@@ -5182,7 +5182,7 @@
                 <a:tab algn="l" pos="10058400"/>
               </a:tabLst>
             </a:pPr>
-            <a:fld id="{5981346B-7F10-4BE6-A310-CC7DFD883876}" type="slidenum">
+            <a:fld id="{9226F380-D01F-48EB-9FF2-A858865F482C}" type="slidenum">
               <a:rPr b="0" lang="en-US" sz="1200" strike="noStrike" u="none">
                 <a:solidFill>
                   <a:srgbClr val="000000"/>
@@ -5354,7 +5354,7 @@
                 <a:tab algn="l" pos="10058400"/>
               </a:tabLst>
             </a:pPr>
-            <a:fld id="{8FDF9623-8DEB-48D6-AE88-F207B5CA7256}" type="slidenum">
+            <a:fld id="{D7130215-6F69-4F76-84C8-85A65EA68B20}" type="slidenum">
               <a:rPr b="0" lang="en-US" sz="1200" strike="noStrike" u="none">
                 <a:solidFill>
                   <a:srgbClr val="000000"/>
@@ -5526,7 +5526,7 @@
                 <a:tab algn="l" pos="10058400"/>
               </a:tabLst>
             </a:pPr>
-            <a:fld id="{48A1B43E-1356-4EFC-A2DE-8D267137723D}" type="slidenum">
+            <a:fld id="{CBBD8C16-2A2D-4ABD-8E15-2CB857D123D5}" type="slidenum">
               <a:rPr b="0" lang="en-US" sz="1200" strike="noStrike" u="none">
                 <a:solidFill>
                   <a:srgbClr val="000000"/>
@@ -5698,7 +5698,7 @@
                 <a:tab algn="l" pos="10058400"/>
               </a:tabLst>
             </a:pPr>
-            <a:fld id="{BE929B17-9A6B-4361-8C92-400C5776931E}" type="slidenum">
+            <a:fld id="{A169F5F8-63CB-4765-8698-237DB8883A39}" type="slidenum">
               <a:rPr b="0" lang="en-US" sz="1200" strike="noStrike" u="none">
                 <a:solidFill>
                   <a:srgbClr val="000000"/>
@@ -5870,7 +5870,7 @@
                 <a:tab algn="l" pos="10058400"/>
               </a:tabLst>
             </a:pPr>
-            <a:fld id="{6CF83146-DA12-4AB8-80D2-140933932C12}" type="slidenum">
+            <a:fld id="{45F20FB1-F3CB-45E8-910F-7E49DA1BFF93}" type="slidenum">
               <a:rPr b="0" lang="en-US" sz="1200" strike="noStrike" u="none">
                 <a:solidFill>
                   <a:srgbClr val="000000"/>
@@ -6042,7 +6042,7 @@
                 <a:tab algn="l" pos="10058400"/>
               </a:tabLst>
             </a:pPr>
-            <a:fld id="{77FFC843-CEC0-491E-8AFE-3429B480C446}" type="slidenum">
+            <a:fld id="{D1607826-A51A-45A0-95CF-D9CC9B5E45B5}" type="slidenum">
               <a:rPr b="0" lang="en-US" sz="1200" strike="noStrike" u="none">
                 <a:solidFill>
                   <a:srgbClr val="000000"/>
@@ -6214,7 +6214,7 @@
                 <a:tab algn="l" pos="10058400"/>
               </a:tabLst>
             </a:pPr>
-            <a:fld id="{47D208B1-9104-4B28-9027-F3598EE41735}" type="slidenum">
+            <a:fld id="{D3CA477F-2AF2-448C-AE82-3AEBBA487CC1}" type="slidenum">
               <a:rPr b="0" lang="en-US" sz="1200" strike="noStrike" u="none">
                 <a:solidFill>
                   <a:srgbClr val="000000"/>
@@ -6386,7 +6386,7 @@
                 <a:tab algn="l" pos="10058400"/>
               </a:tabLst>
             </a:pPr>
-            <a:fld id="{DCC8D5D7-96B7-4CC4-97F1-EE472453EE8A}" type="slidenum">
+            <a:fld id="{AF878B55-8BCE-4785-9043-A9D172044D05}" type="slidenum">
               <a:rPr b="0" lang="en-US" sz="1200" strike="noStrike" u="none">
                 <a:solidFill>
                   <a:srgbClr val="000000"/>
@@ -6558,7 +6558,7 @@
                 <a:tab algn="l" pos="10058400"/>
               </a:tabLst>
             </a:pPr>
-            <a:fld id="{A2C184A1-59E0-47F9-8EC4-B94992C9BE36}" type="slidenum">
+            <a:fld id="{AC0BB962-C7E9-4A7F-BC55-2587184419FF}" type="slidenum">
               <a:rPr b="0" lang="en-US" sz="1200" strike="noStrike" u="none">
                 <a:solidFill>
                   <a:srgbClr val="000000"/>
@@ -6730,7 +6730,7 @@
                 <a:tab algn="l" pos="10058400"/>
               </a:tabLst>
             </a:pPr>
-            <a:fld id="{A91EEBB3-CD40-4D45-82C3-9F1CC0581FDE}" type="slidenum">
+            <a:fld id="{75A1734F-F3EB-42E1-8002-A910BDFA6572}" type="slidenum">
               <a:rPr b="0" lang="en-US" sz="1200" strike="noStrike" u="none">
                 <a:solidFill>
                   <a:srgbClr val="000000"/>
@@ -6902,7 +6902,7 @@
                 <a:tab algn="l" pos="10058400"/>
               </a:tabLst>
             </a:pPr>
-            <a:fld id="{6B27AF9C-4743-4299-B764-0DC46E36FECA}" type="slidenum">
+            <a:fld id="{158312DD-CBFE-467D-A77C-0F747457297F}" type="slidenum">
               <a:rPr b="0" lang="en-US" sz="1200" strike="noStrike" u="none">
                 <a:solidFill>
                   <a:srgbClr val="000000"/>
@@ -7074,7 +7074,7 @@
                 <a:tab algn="l" pos="10058400"/>
               </a:tabLst>
             </a:pPr>
-            <a:fld id="{F03A4F08-6C88-44B5-91FF-69A0550713D6}" type="slidenum">
+            <a:fld id="{BB952FAA-F5F6-42B7-A1AA-9F689AA375A3}" type="slidenum">
               <a:rPr b="0" lang="en-US" sz="1200" strike="noStrike" u="none">
                 <a:solidFill>
                   <a:srgbClr val="000000"/>
@@ -7821,7 +7821,7 @@
               </a:rPr>
               <a:t>Slide </a:t>
             </a:r>
-            <a:fld id="{9822078A-19F1-4A99-9CBF-6A084F2BEBA1}" type="slidenum">
+            <a:fld id="{2F6C188E-688A-4F1A-BBD9-C567639042C1}" type="slidenum">
               <a:rPr b="1" lang="en-US" sz="800" strike="noStrike" u="none">
                 <a:solidFill>
                   <a:srgbClr val="ffffff"/>

</xml_diff>